<commit_message>
Update 5. Programación Entera mixta.pptx
</commit_message>
<xml_diff>
--- a/1. Lectures/Introducción a la Optimización aplicada a Sistemas de Energía Eléctrica/Dia 1/5. Programación Entera mixta.pptx
+++ b/1. Lectures/Introducción a la Optimización aplicada a Sistemas de Energía Eléctrica/Dia 1/5. Programación Entera mixta.pptx
@@ -299,7 +299,7 @@
             <a:fld id="{27A565BD-2940-4473-877F-C1308FF5E531}" type="slidenum">
               <a:rPr lang="es-ES" smtClean="0"/>
               <a:pPr/>
-              <a:t>‹#›</a:t>
+              <a:t>‹Nº›</a:t>
             </a:fld>
             <a:endParaRPr lang="es-ES"/>
           </a:p>
@@ -562,7 +562,7 @@
             <a:fld id="{8AD6E850-6E96-4E89-86F1-2DE46BB95531}" type="slidenum">
               <a:rPr lang="es-ES" smtClean="0"/>
               <a:pPr/>
-              <a:t>‹#›</a:t>
+              <a:t>‹Nº›</a:t>
             </a:fld>
             <a:endParaRPr lang="es-ES"/>
           </a:p>
@@ -1091,7 +1091,7 @@
             <a:fld id="{64BD7E74-CBD2-4D88-9109-2EA8081AE675}" type="slidenum">
               <a:rPr lang="es-ES" smtClean="0"/>
               <a:pPr/>
-              <a:t>‹#›</a:t>
+              <a:t>‹Nº›</a:t>
             </a:fld>
             <a:endParaRPr lang="es-ES"/>
           </a:p>
@@ -1521,7 +1521,7 @@
             <a:fld id="{64BD7E74-CBD2-4D88-9109-2EA8081AE675}" type="slidenum">
               <a:rPr lang="es-ES" smtClean="0"/>
               <a:pPr/>
-              <a:t>‹#›</a:t>
+              <a:t>‹Nº›</a:t>
             </a:fld>
             <a:endParaRPr lang="es-ES"/>
           </a:p>
@@ -1712,7 +1712,7 @@
             <a:fld id="{64BD7E74-CBD2-4D88-9109-2EA8081AE675}" type="slidenum">
               <a:rPr lang="es-ES" smtClean="0"/>
               <a:pPr/>
-              <a:t>‹#›</a:t>
+              <a:t>‹Nº›</a:t>
             </a:fld>
             <a:endParaRPr lang="es-ES"/>
           </a:p>
@@ -1850,7 +1850,7 @@
             <a:fld id="{64BD7E74-CBD2-4D88-9109-2EA8081AE675}" type="slidenum">
               <a:rPr lang="es-ES" smtClean="0"/>
               <a:pPr/>
-              <a:t>‹#›</a:t>
+              <a:t>‹Nº›</a:t>
             </a:fld>
             <a:endParaRPr lang="es-ES"/>
           </a:p>
@@ -2371,7 +2371,7 @@
             <a:fld id="{64BD7E74-CBD2-4D88-9109-2EA8081AE675}" type="slidenum">
               <a:rPr lang="es-ES" smtClean="0"/>
               <a:pPr/>
-              <a:t>‹#›</a:t>
+              <a:t>‹Nº›</a:t>
             </a:fld>
             <a:endParaRPr lang="es-ES"/>
           </a:p>
@@ -2500,7 +2500,7 @@
             <a:fld id="{64BD7E74-CBD2-4D88-9109-2EA8081AE675}" type="slidenum">
               <a:rPr lang="es-ES" smtClean="0"/>
               <a:pPr/>
-              <a:t>‹#›</a:t>
+              <a:t>‹Nº›</a:t>
             </a:fld>
             <a:endParaRPr lang="es-ES"/>
           </a:p>
@@ -2878,7 +2878,7 @@
             <a:fld id="{64BD7E74-CBD2-4D88-9109-2EA8081AE675}" type="slidenum">
               <a:rPr lang="es-ES" smtClean="0"/>
               <a:pPr/>
-              <a:t>‹#›</a:t>
+              <a:t>‹Nº›</a:t>
             </a:fld>
             <a:endParaRPr lang="es-ES"/>
           </a:p>
@@ -3131,7 +3131,7 @@
             <a:fld id="{64BD7E74-CBD2-4D88-9109-2EA8081AE675}" type="slidenum">
               <a:rPr lang="es-ES" smtClean="0"/>
               <a:pPr/>
-              <a:t>‹#›</a:t>
+              <a:t>‹Nº›</a:t>
             </a:fld>
             <a:endParaRPr lang="es-ES"/>
           </a:p>
@@ -3267,7 +3267,7 @@
             <a:fld id="{64BD7E74-CBD2-4D88-9109-2EA8081AE675}" type="slidenum">
               <a:rPr lang="es-ES" smtClean="0"/>
               <a:pPr/>
-              <a:t>‹#›</a:t>
+              <a:t>‹Nº›</a:t>
             </a:fld>
             <a:endParaRPr lang="es-ES"/>
           </a:p>
@@ -3550,7 +3550,7 @@
             <a:fld id="{64BD7E74-CBD2-4D88-9109-2EA8081AE675}" type="slidenum">
               <a:rPr lang="es-ES" smtClean="0"/>
               <a:pPr/>
-              <a:t>‹#›</a:t>
+              <a:t>‹Nº›</a:t>
             </a:fld>
             <a:endParaRPr lang="es-ES"/>
           </a:p>
@@ -3799,7 +3799,7 @@
             <a:fld id="{64BD7E74-CBD2-4D88-9109-2EA8081AE675}" type="slidenum">
               <a:rPr lang="es-ES" smtClean="0"/>
               <a:pPr/>
-              <a:t>‹#›</a:t>
+              <a:t>‹Nº›</a:t>
             </a:fld>
             <a:endParaRPr lang="es-ES"/>
           </a:p>
@@ -4271,7 +4271,7 @@
             <a:fld id="{64BD7E74-CBD2-4D88-9109-2EA8081AE675}" type="slidenum">
               <a:rPr lang="es-ES" smtClean="0"/>
               <a:pPr/>
-              <a:t>‹#›</a:t>
+              <a:t>‹Nº›</a:t>
             </a:fld>
             <a:endParaRPr lang="es-ES" dirty="0"/>
           </a:p>
@@ -4782,25 +4782,7 @@
                 </a:solidFill>
                 <a:latin typeface="Bookman Old Style" panose="02050604050505020204" pitchFamily="18" charset="0"/>
               </a:rPr>
-              <a:t>Introducción</a:t>
-            </a:r>
-            <a:r>
-              <a:rPr lang="en-US" sz="2400" kern="1400" cap="small" dirty="0">
-                <a:solidFill>
-                  <a:schemeClr val="bg1"/>
-                </a:solidFill>
-                <a:latin typeface="Bookman Old Style" panose="02050604050505020204" pitchFamily="18" charset="0"/>
-              </a:rPr>
-              <a:t> a la </a:t>
-            </a:r>
-            <a:r>
-              <a:rPr lang="en-US" sz="2400" kern="1400" cap="small" dirty="0" err="1">
-                <a:solidFill>
-                  <a:schemeClr val="bg1"/>
-                </a:solidFill>
-                <a:latin typeface="Bookman Old Style" panose="02050604050505020204" pitchFamily="18" charset="0"/>
-              </a:rPr>
-              <a:t>Optimización</a:t>
+              <a:t>Programación</a:t>
             </a:r>
             <a:r>
               <a:rPr lang="en-US" sz="2400" kern="1400" cap="small" dirty="0">
@@ -4811,14 +4793,6 @@
               </a:rPr>
               <a:t> </a:t>
             </a:r>
-            <a:br>
-              <a:rPr lang="en-US" sz="2400" kern="1400" cap="small" dirty="0">
-                <a:solidFill>
-                  <a:schemeClr val="bg1"/>
-                </a:solidFill>
-                <a:latin typeface="Bookman Old Style" panose="02050604050505020204" pitchFamily="18" charset="0"/>
-              </a:rPr>
-            </a:br>
             <a:r>
               <a:rPr lang="en-US" sz="2400" kern="1400" cap="small" dirty="0" err="1">
                 <a:solidFill>
@@ -4826,7 +4800,7 @@
                 </a:solidFill>
                 <a:latin typeface="Bookman Old Style" panose="02050604050505020204" pitchFamily="18" charset="0"/>
               </a:rPr>
-              <a:t>en</a:t>
+              <a:t>Entera</a:t>
             </a:r>
             <a:r>
               <a:rPr lang="en-US" sz="2400" kern="1400" cap="small" dirty="0">
@@ -4844,43 +4818,7 @@
                 </a:solidFill>
                 <a:latin typeface="Bookman Old Style" panose="02050604050505020204" pitchFamily="18" charset="0"/>
               </a:rPr>
-              <a:t>Sistemas</a:t>
-            </a:r>
-            <a:r>
-              <a:rPr lang="en-US" sz="2400" kern="1400" cap="small" dirty="0">
-                <a:solidFill>
-                  <a:schemeClr val="bg1"/>
-                </a:solidFill>
-                <a:latin typeface="Bookman Old Style" panose="02050604050505020204" pitchFamily="18" charset="0"/>
-              </a:rPr>
-              <a:t> </a:t>
-            </a:r>
-            <a:r>
-              <a:rPr lang="en-US" sz="2400" kern="1400" cap="small" dirty="0" err="1">
-                <a:solidFill>
-                  <a:schemeClr val="bg1"/>
-                </a:solidFill>
-                <a:latin typeface="Bookman Old Style" panose="02050604050505020204" pitchFamily="18" charset="0"/>
-              </a:rPr>
-              <a:t>Eléctricos</a:t>
-            </a:r>
-            <a:r>
-              <a:rPr lang="en-US" sz="2400" kern="1400" cap="small" dirty="0">
-                <a:solidFill>
-                  <a:schemeClr val="bg1"/>
-                </a:solidFill>
-                <a:latin typeface="Bookman Old Style" panose="02050604050505020204" pitchFamily="18" charset="0"/>
-              </a:rPr>
-              <a:t> de </a:t>
-            </a:r>
-            <a:r>
-              <a:rPr lang="en-US" sz="2400" kern="1400" cap="small" dirty="0" err="1">
-                <a:solidFill>
-                  <a:schemeClr val="bg1"/>
-                </a:solidFill>
-                <a:latin typeface="Bookman Old Style" panose="02050604050505020204" pitchFamily="18" charset="0"/>
-              </a:rPr>
-              <a:t>Potencia</a:t>
+              <a:t>Mixta</a:t>
             </a:r>
             <a:endParaRPr lang="es-ES" sz="2400" cap="small" dirty="0">
               <a:solidFill>
@@ -5104,8 +5042,8 @@
         </p:nvSpPr>
         <p:spPr>
           <a:xfrm>
-            <a:off x="3383691" y="355303"/>
-            <a:ext cx="2521844" cy="769441"/>
+            <a:off x="3775625" y="355303"/>
+            <a:ext cx="1737976" cy="769441"/>
           </a:xfrm>
           <a:prstGeom prst="rect">
             <a:avLst/>
@@ -5119,11 +5057,14 @@
           <a:lstStyle/>
           <a:p>
             <a:r>
-              <a:rPr lang="en-US" sz="4400" dirty="0">
+              <a:rPr lang="en-US" sz="4400" dirty="0" err="1">
                 <a:latin typeface="Old English Text MT" panose="03040902040508030806" pitchFamily="66" charset="0"/>
               </a:rPr>
-              <a:t>Workshop</a:t>
-            </a:r>
+              <a:t>Tópico</a:t>
+            </a:r>
+            <a:endParaRPr lang="en-US" sz="4400" dirty="0">
+              <a:latin typeface="Old English Text MT" panose="03040902040508030806" pitchFamily="66" charset="0"/>
+            </a:endParaRPr>
           </a:p>
         </p:txBody>
       </p:sp>

</xml_diff>